<commit_message>
Modify illustration for servlet async
</commit_message>
<xml_diff>
--- a/servlet-async.pptx
+++ b/servlet-async.pptx
@@ -218,7 +218,7 @@
           <a:p>
             <a:fld id="{9E504720-E6DD-564E-A9E4-6973BED6C95B}" type="datetimeFigureOut">
               <a:rPr kumimoji="1" lang="ja-JP" altLang="en-US" smtClean="0"/>
-              <a:t>2016/5/15</a:t>
+              <a:t>2016/5/16</a:t>
             </a:fld>
             <a:endParaRPr kumimoji="1" lang="ja-JP" altLang="en-US"/>
           </a:p>
@@ -901,7 +901,7 @@
           <a:p>
             <a:fld id="{2D836C50-4024-0240-9768-AF72A8EA574D}" type="datetimeFigureOut">
               <a:rPr kumimoji="1" lang="ja-JP" altLang="en-US" smtClean="0"/>
-              <a:t>2016/5/15</a:t>
+              <a:t>2016/5/16</a:t>
             </a:fld>
             <a:endParaRPr kumimoji="1" lang="ja-JP" altLang="en-US"/>
           </a:p>
@@ -1103,7 +1103,7 @@
           <a:p>
             <a:fld id="{2D836C50-4024-0240-9768-AF72A8EA574D}" type="datetimeFigureOut">
               <a:rPr kumimoji="1" lang="ja-JP" altLang="en-US" smtClean="0"/>
-              <a:t>2016/5/15</a:t>
+              <a:t>2016/5/16</a:t>
             </a:fld>
             <a:endParaRPr kumimoji="1" lang="ja-JP" altLang="en-US"/>
           </a:p>
@@ -1315,7 +1315,7 @@
           <a:p>
             <a:fld id="{2D836C50-4024-0240-9768-AF72A8EA574D}" type="datetimeFigureOut">
               <a:rPr kumimoji="1" lang="ja-JP" altLang="en-US" smtClean="0"/>
-              <a:t>2016/5/15</a:t>
+              <a:t>2016/5/16</a:t>
             </a:fld>
             <a:endParaRPr kumimoji="1" lang="ja-JP" altLang="en-US"/>
           </a:p>
@@ -1517,7 +1517,7 @@
           <a:p>
             <a:fld id="{2D836C50-4024-0240-9768-AF72A8EA574D}" type="datetimeFigureOut">
               <a:rPr kumimoji="1" lang="ja-JP" altLang="en-US" smtClean="0"/>
-              <a:t>2016/5/15</a:t>
+              <a:t>2016/5/16</a:t>
             </a:fld>
             <a:endParaRPr kumimoji="1" lang="ja-JP" altLang="en-US"/>
           </a:p>
@@ -1763,7 +1763,7 @@
           <a:p>
             <a:fld id="{2D836C50-4024-0240-9768-AF72A8EA574D}" type="datetimeFigureOut">
               <a:rPr kumimoji="1" lang="ja-JP" altLang="en-US" smtClean="0"/>
-              <a:t>2016/5/15</a:t>
+              <a:t>2016/5/16</a:t>
             </a:fld>
             <a:endParaRPr kumimoji="1" lang="ja-JP" altLang="en-US"/>
           </a:p>
@@ -2059,7 +2059,7 @@
           <a:p>
             <a:fld id="{2D836C50-4024-0240-9768-AF72A8EA574D}" type="datetimeFigureOut">
               <a:rPr kumimoji="1" lang="ja-JP" altLang="en-US" smtClean="0"/>
-              <a:t>2016/5/15</a:t>
+              <a:t>2016/5/16</a:t>
             </a:fld>
             <a:endParaRPr kumimoji="1" lang="ja-JP" altLang="en-US"/>
           </a:p>
@@ -2490,7 +2490,7 @@
           <a:p>
             <a:fld id="{2D836C50-4024-0240-9768-AF72A8EA574D}" type="datetimeFigureOut">
               <a:rPr kumimoji="1" lang="ja-JP" altLang="en-US" smtClean="0"/>
-              <a:t>2016/5/15</a:t>
+              <a:t>2016/5/16</a:t>
             </a:fld>
             <a:endParaRPr kumimoji="1" lang="ja-JP" altLang="en-US"/>
           </a:p>
@@ -2608,7 +2608,7 @@
           <a:p>
             <a:fld id="{2D836C50-4024-0240-9768-AF72A8EA574D}" type="datetimeFigureOut">
               <a:rPr kumimoji="1" lang="ja-JP" altLang="en-US" smtClean="0"/>
-              <a:t>2016/5/15</a:t>
+              <a:t>2016/5/16</a:t>
             </a:fld>
             <a:endParaRPr kumimoji="1" lang="ja-JP" altLang="en-US"/>
           </a:p>
@@ -2703,7 +2703,7 @@
           <a:p>
             <a:fld id="{2D836C50-4024-0240-9768-AF72A8EA574D}" type="datetimeFigureOut">
               <a:rPr kumimoji="1" lang="ja-JP" altLang="en-US" smtClean="0"/>
-              <a:t>2016/5/15</a:t>
+              <a:t>2016/5/16</a:t>
             </a:fld>
             <a:endParaRPr kumimoji="1" lang="ja-JP" altLang="en-US"/>
           </a:p>
@@ -3012,7 +3012,7 @@
           <a:p>
             <a:fld id="{2D836C50-4024-0240-9768-AF72A8EA574D}" type="datetimeFigureOut">
               <a:rPr kumimoji="1" lang="ja-JP" altLang="en-US" smtClean="0"/>
-              <a:t>2016/5/15</a:t>
+              <a:t>2016/5/16</a:t>
             </a:fld>
             <a:endParaRPr kumimoji="1" lang="ja-JP" altLang="en-US"/>
           </a:p>
@@ -3265,7 +3265,7 @@
           <a:p>
             <a:fld id="{2D836C50-4024-0240-9768-AF72A8EA574D}" type="datetimeFigureOut">
               <a:rPr kumimoji="1" lang="ja-JP" altLang="en-US" smtClean="0"/>
-              <a:t>2016/5/15</a:t>
+              <a:t>2016/5/16</a:t>
             </a:fld>
             <a:endParaRPr kumimoji="1" lang="ja-JP" altLang="en-US"/>
           </a:p>
@@ -3510,7 +3510,7 @@
           <a:p>
             <a:fld id="{2D836C50-4024-0240-9768-AF72A8EA574D}" type="datetimeFigureOut">
               <a:rPr kumimoji="1" lang="ja-JP" altLang="en-US" smtClean="0"/>
-              <a:t>2016/5/15</a:t>
+              <a:t>2016/5/16</a:t>
             </a:fld>
             <a:endParaRPr kumimoji="1" lang="ja-JP" altLang="en-US"/>
           </a:p>
@@ -4419,13 +4419,6 @@
               </a:rPr>
               <a:t>http-nio-8080-exec-9</a:t>
             </a:r>
-            <a:endParaRPr lang="en-US" altLang="ja-JP" sz="1400" dirty="0">
-              <a:solidFill>
-                <a:schemeClr val="tx1"/>
-              </a:solidFill>
-              <a:latin typeface="HGP創英角ｺﾞｼｯｸUB" panose="020B0900000000000000" pitchFamily="50" charset="-128"/>
-              <a:ea typeface="HGP創英角ｺﾞｼｯｸUB" panose="020B0900000000000000" pitchFamily="50" charset="-128"/>
-            </a:endParaRPr>
           </a:p>
         </p:txBody>
       </p:sp>
@@ -5088,14 +5081,6 @@
               </a:rPr>
               <a:t>=REQUEST</a:t>
             </a:r>
-            <a:endParaRPr lang="en-US" altLang="ja-JP" sz="1400" dirty="0" smtClean="0">
-              <a:solidFill>
-                <a:schemeClr val="tx1">
-                  <a:lumMod val="50000"/>
-                  <a:lumOff val="50000"/>
-                </a:schemeClr>
-              </a:solidFill>
-            </a:endParaRPr>
           </a:p>
         </p:txBody>
       </p:sp>
@@ -5171,14 +5156,6 @@
               </a:rPr>
               <a:t>=ASYNC</a:t>
             </a:r>
-            <a:endParaRPr lang="en-US" altLang="ja-JP" sz="1400" dirty="0" smtClean="0">
-              <a:solidFill>
-                <a:schemeClr val="tx1">
-                  <a:lumMod val="50000"/>
-                  <a:lumOff val="50000"/>
-                </a:schemeClr>
-              </a:solidFill>
-            </a:endParaRPr>
           </a:p>
         </p:txBody>
       </p:sp>
@@ -7754,8 +7731,8 @@
         </p:nvSpPr>
         <p:spPr>
           <a:xfrm>
-            <a:off x="3034530" y="2740329"/>
-            <a:ext cx="755335" cy="338554"/>
+            <a:off x="2917300" y="2716883"/>
+            <a:ext cx="987771" cy="338554"/>
           </a:xfrm>
           <a:prstGeom prst="rect">
             <a:avLst/>
@@ -7770,7 +7747,7 @@
           <a:p>
             <a:r>
               <a:rPr kumimoji="1" lang="en-US" altLang="ja-JP" sz="1600" smtClean="0"/>
-              <a:t>chunk</a:t>
+              <a:t>chunked</a:t>
             </a:r>
             <a:endParaRPr kumimoji="1" lang="ja-JP" altLang="en-US" sz="1600" dirty="0"/>
           </a:p>

</xml_diff>